<commit_message>
Update Help social centers accurately identify patients  having ptsd.pptx
</commit_message>
<xml_diff>
--- a/project_3/Help social centers accurately identify patients  having ptsd.pptx
+++ b/project_3/Help social centers accurately identify patients  having ptsd.pptx
@@ -214,7 +214,7 @@
           <a:p>
             <a:fld id="{CC6DBDFE-DD3D-4291-A404-1B97A83A6EA8}" type="datetimeFigureOut">
               <a:rPr lang="en-US" smtClean="0"/>
-              <a:t>3/31/2022</a:t>
+              <a:t>4/1/2022</a:t>
             </a:fld>
             <a:endParaRPr lang="en-US" dirty="0"/>
           </a:p>
@@ -1094,7 +1094,7 @@
           <a:p>
             <a:fld id="{EA0C0817-A112-4847-8014-A94B7D2A4EA3}" type="datetime1">
               <a:rPr lang="en-US" smtClean="0"/>
-              <a:t>3/31/2022</a:t>
+              <a:t>4/1/2022</a:t>
             </a:fld>
             <a:endParaRPr lang="en-US" dirty="0"/>
           </a:p>
@@ -1296,7 +1296,7 @@
           <a:p>
             <a:fld id="{7332B432-ACDA-4023-A761-2BAB76577B62}" type="datetime1">
               <a:rPr lang="en-US" smtClean="0"/>
-              <a:t>3/31/2022</a:t>
+              <a:t>4/1/2022</a:t>
             </a:fld>
             <a:endParaRPr lang="en-US" dirty="0"/>
           </a:p>
@@ -1895,7 +1895,7 @@
           <a:p>
             <a:fld id="{D9C646AA-F36E-4540-911D-FFFC0A0EF24A}" type="datetime1">
               <a:rPr lang="en-US" smtClean="0"/>
-              <a:t>3/31/2022</a:t>
+              <a:t>4/1/2022</a:t>
             </a:fld>
             <a:endParaRPr lang="en-US" dirty="0"/>
           </a:p>
@@ -2215,7 +2215,7 @@
           <a:p>
             <a:fld id="{69186D26-FA5F-4637-B602-B7C2DC34CFD4}" type="datetime1">
               <a:rPr lang="en-US" smtClean="0"/>
-              <a:t>3/31/2022</a:t>
+              <a:t>4/1/2022</a:t>
             </a:fld>
             <a:endParaRPr lang="en-US" dirty="0"/>
           </a:p>
@@ -2652,7 +2652,7 @@
           <a:p>
             <a:fld id="{8A7F15D8-96D1-4781-BC50-CA8A088B2FE4}" type="datetime1">
               <a:rPr lang="en-US" smtClean="0"/>
-              <a:t>3/31/2022</a:t>
+              <a:t>4/1/2022</a:t>
             </a:fld>
             <a:endParaRPr lang="en-US" dirty="0"/>
           </a:p>
@@ -2770,7 +2770,7 @@
           <a:p>
             <a:fld id="{F9A96C99-B8F8-4528-BD05-0E16E943DC09}" type="datetime1">
               <a:rPr lang="en-US" smtClean="0"/>
-              <a:t>3/31/2022</a:t>
+              <a:t>4/1/2022</a:t>
             </a:fld>
             <a:endParaRPr lang="en-US" dirty="0"/>
           </a:p>
@@ -2865,7 +2865,7 @@
           <a:p>
             <a:fld id="{03636942-C211-4B28-8DBD-C953E00AF71B}" type="datetime1">
               <a:rPr lang="en-US" smtClean="0"/>
-              <a:t>3/31/2022</a:t>
+              <a:t>4/1/2022</a:t>
             </a:fld>
             <a:endParaRPr lang="en-US" dirty="0"/>
           </a:p>
@@ -3282,7 +3282,7 @@
           <a:p>
             <a:fld id="{7E8D12A6-918A-48BD-8CB9-CA713993B0EA}" type="datetime1">
               <a:rPr lang="en-US" smtClean="0"/>
-              <a:t>3/31/2022</a:t>
+              <a:t>4/1/2022</a:t>
             </a:fld>
             <a:endParaRPr lang="en-US" dirty="0"/>
           </a:p>
@@ -3544,7 +3544,7 @@
             <a:fld id="{E778CE86-875F-4587-BCF6-FA054AFC0D53}" type="datetime1">
               <a:rPr lang="en-US" smtClean="0"/>
               <a:pPr/>
-              <a:t>3/31/2022</a:t>
+              <a:t>4/1/2022</a:t>
             </a:fld>
             <a:endParaRPr lang="en-US" dirty="0"/>
           </a:p>
@@ -4060,7 +4060,7 @@
           <a:p>
             <a:fld id="{F6FA2B21-3FCD-4721-B95C-427943F61125}" type="datetime1">
               <a:rPr lang="en-US" smtClean="0"/>
-              <a:t>3/31/2022</a:t>
+              <a:t>4/1/2022</a:t>
             </a:fld>
             <a:endParaRPr lang="en-US" dirty="0"/>
           </a:p>
@@ -5907,26 +5907,6 @@
                   <a:srgbClr val="65739F"/>
                 </a:solidFill>
               </a:rPr>
-              <a:t> </a:t>
-            </a:r>
-            <a:r>
-              <a:rPr lang="en-US" sz="1400" i="1" dirty="0">
-                <a:solidFill>
-                  <a:srgbClr val="65739F"/>
-                </a:solidFill>
-              </a:rPr>
-              <a:t>gunshot</a:t>
-            </a:r>
-            <a:r>
-              <a:rPr lang="en-US" sz="1400" dirty="0"/>
-              <a:t>,</a:t>
-            </a:r>
-            <a:r>
-              <a:rPr lang="en-US" sz="1400" dirty="0">
-                <a:solidFill>
-                  <a:srgbClr val="65739F"/>
-                </a:solidFill>
-              </a:rPr>
               <a:t> “</a:t>
             </a:r>
             <a:r>
@@ -5960,18 +5940,6 @@
             <a:r>
               <a:rPr lang="en-US" sz="1400" i="1" dirty="0"/>
               <a:t>childhood sexual abuse</a:t>
-            </a:r>
-            <a:r>
-              <a:rPr lang="en-US" sz="1400" dirty="0"/>
-              <a:t>, </a:t>
-            </a:r>
-            <a:r>
-              <a:rPr lang="en-US" sz="1400" dirty="0">
-                <a:solidFill>
-                  <a:srgbClr val="65739F"/>
-                </a:solidFill>
-              </a:rPr>
-              <a:t>repressed</a:t>
             </a:r>
             <a:r>
               <a:rPr lang="en-US" sz="1400" dirty="0"/>
@@ -6089,7 +6057,7 @@
         </p:nvSpPr>
         <p:spPr>
           <a:xfrm flipH="1">
-            <a:off x="7734300" y="5664729"/>
+            <a:off x="6861463" y="5655581"/>
             <a:ext cx="1249680" cy="307777"/>
           </a:xfrm>
           <a:prstGeom prst="rect">
@@ -6129,13 +6097,13 @@
   <p:clrMapOvr>
     <a:masterClrMapping/>
   </p:clrMapOvr>
-  <mc:AlternateContent xmlns:mc="http://schemas.openxmlformats.org/markup-compatibility/2006">
-    <mc:Choice xmlns:p159="http://schemas.microsoft.com/office/powerpoint/2015/09/main" Requires="p159">
+  <mc:AlternateContent xmlns:mc="http://schemas.openxmlformats.org/markup-compatibility/2006" xmlns:p159="http://schemas.microsoft.com/office/powerpoint/2015/09/main">
+    <mc:Choice Requires="p159">
       <p:transition>
         <p159:morph option="byObject"/>
       </p:transition>
     </mc:Choice>
-    <mc:Fallback>
+    <mc:Fallback xmlns="">
       <p:transition>
         <p:fade/>
       </p:transition>
@@ -6766,13 +6734,13 @@
   <p:clrMapOvr>
     <a:masterClrMapping/>
   </p:clrMapOvr>
-  <mc:AlternateContent xmlns:mc="http://schemas.openxmlformats.org/markup-compatibility/2006">
-    <mc:Choice xmlns:p159="http://schemas.microsoft.com/office/powerpoint/2015/09/main" Requires="p159">
+  <mc:AlternateContent xmlns:mc="http://schemas.openxmlformats.org/markup-compatibility/2006" xmlns:p159="http://schemas.microsoft.com/office/powerpoint/2015/09/main">
+    <mc:Choice Requires="p159">
       <p:transition>
         <p159:morph option="byObject"/>
       </p:transition>
     </mc:Choice>
-    <mc:Fallback>
+    <mc:Fallback xmlns="">
       <p:transition>
         <p:fade/>
       </p:transition>
@@ -8947,8 +8915,8 @@
         </p:nvSpPr>
         <p:spPr>
           <a:xfrm>
-            <a:off x="7523018" y="1888177"/>
-            <a:ext cx="2821984" cy="237506"/>
+            <a:off x="1194178" y="1888177"/>
+            <a:ext cx="9150824" cy="237506"/>
           </a:xfrm>
           <a:prstGeom prst="rect">
             <a:avLst/>
@@ -8957,6 +8925,146 @@
           <a:ln>
             <a:solidFill>
               <a:srgbClr val="FF0000"/>
+            </a:solidFill>
+          </a:ln>
+        </p:spPr>
+        <p:style>
+          <a:lnRef idx="2">
+            <a:schemeClr val="accent1">
+              <a:shade val="50000"/>
+            </a:schemeClr>
+          </a:lnRef>
+          <a:fillRef idx="1">
+            <a:schemeClr val="accent1"/>
+          </a:fillRef>
+          <a:effectRef idx="0">
+            <a:schemeClr val="accent1"/>
+          </a:effectRef>
+          <a:fontRef idx="minor">
+            <a:schemeClr val="lt1"/>
+          </a:fontRef>
+        </p:style>
+        <p:txBody>
+          <a:bodyPr rtlCol="0" anchor="ctr"/>
+          <a:lstStyle/>
+          <a:p>
+            <a:pPr algn="ctr"/>
+            <a:endParaRPr lang="en-SG"/>
+          </a:p>
+        </p:txBody>
+      </p:sp>
+      <p:sp>
+        <p:nvSpPr>
+          <p:cNvPr id="3" name="TextBox 2">
+            <a:extLst>
+              <a:ext uri="{FF2B5EF4-FFF2-40B4-BE49-F238E27FC236}">
+                <a16:creationId xmlns:a16="http://schemas.microsoft.com/office/drawing/2014/main" id="{597AC0E0-50EE-4FDD-8E3A-71987413442E}"/>
+              </a:ext>
+            </a:extLst>
+          </p:cNvPr>
+          <p:cNvSpPr txBox="1"/>
+          <p:nvPr/>
+        </p:nvSpPr>
+        <p:spPr>
+          <a:xfrm>
+            <a:off x="6812789" y="1457911"/>
+            <a:ext cx="1899879" cy="253916"/>
+          </a:xfrm>
+          <a:prstGeom prst="rect">
+            <a:avLst/>
+          </a:prstGeom>
+          <a:noFill/>
+        </p:spPr>
+        <p:txBody>
+          <a:bodyPr wrap="none" rtlCol="0">
+            <a:spAutoFit/>
+          </a:bodyPr>
+          <a:lstStyle/>
+          <a:p>
+            <a:r>
+              <a:rPr lang="en-US" sz="1050" dirty="0"/>
+              <a:t>Accuracy improved by 5.8%</a:t>
+            </a:r>
+            <a:endParaRPr lang="en-SG" sz="1050" dirty="0"/>
+          </a:p>
+        </p:txBody>
+      </p:sp>
+      <p:sp>
+        <p:nvSpPr>
+          <p:cNvPr id="4" name="Oval 3">
+            <a:extLst>
+              <a:ext uri="{FF2B5EF4-FFF2-40B4-BE49-F238E27FC236}">
+                <a16:creationId xmlns:a16="http://schemas.microsoft.com/office/drawing/2014/main" id="{5E4320F3-A451-4D05-92A5-9880B35BECFE}"/>
+              </a:ext>
+            </a:extLst>
+          </p:cNvPr>
+          <p:cNvSpPr/>
+          <p:nvPr/>
+        </p:nvSpPr>
+        <p:spPr>
+          <a:xfrm>
+            <a:off x="7606145" y="1942981"/>
+            <a:ext cx="356260" cy="123325"/>
+          </a:xfrm>
+          <a:prstGeom prst="ellipse">
+            <a:avLst/>
+          </a:prstGeom>
+          <a:noFill/>
+          <a:ln>
+            <a:solidFill>
+              <a:srgbClr val="B6C9DD"/>
+            </a:solidFill>
+          </a:ln>
+        </p:spPr>
+        <p:style>
+          <a:lnRef idx="2">
+            <a:schemeClr val="accent1">
+              <a:shade val="50000"/>
+            </a:schemeClr>
+          </a:lnRef>
+          <a:fillRef idx="1">
+            <a:schemeClr val="accent1"/>
+          </a:fillRef>
+          <a:effectRef idx="0">
+            <a:schemeClr val="accent1"/>
+          </a:effectRef>
+          <a:fontRef idx="minor">
+            <a:schemeClr val="lt1"/>
+          </a:fontRef>
+        </p:style>
+        <p:txBody>
+          <a:bodyPr rtlCol="0" anchor="ctr"/>
+          <a:lstStyle/>
+          <a:p>
+            <a:pPr algn="ctr"/>
+            <a:endParaRPr lang="en-SG"/>
+          </a:p>
+        </p:txBody>
+      </p:sp>
+      <p:sp>
+        <p:nvSpPr>
+          <p:cNvPr id="9" name="Oval 8">
+            <a:extLst>
+              <a:ext uri="{FF2B5EF4-FFF2-40B4-BE49-F238E27FC236}">
+                <a16:creationId xmlns:a16="http://schemas.microsoft.com/office/drawing/2014/main" id="{C4C05174-55B0-420C-B21B-675C17CC7E02}"/>
+              </a:ext>
+            </a:extLst>
+          </p:cNvPr>
+          <p:cNvSpPr/>
+          <p:nvPr/>
+        </p:nvSpPr>
+        <p:spPr>
+          <a:xfrm>
+            <a:off x="7584598" y="3273701"/>
+            <a:ext cx="356260" cy="123325"/>
+          </a:xfrm>
+          <a:prstGeom prst="ellipse">
+            <a:avLst/>
+          </a:prstGeom>
+          <a:noFill/>
+          <a:ln>
+            <a:solidFill>
+              <a:srgbClr val="B6C9DD"/>
             </a:solidFill>
           </a:ln>
         </p:spPr>
@@ -12789,13 +12897,13 @@
   <p:clrMapOvr>
     <a:masterClrMapping/>
   </p:clrMapOvr>
-  <mc:AlternateContent xmlns:mc="http://schemas.openxmlformats.org/markup-compatibility/2006">
-    <mc:Choice xmlns:p159="http://schemas.microsoft.com/office/powerpoint/2015/09/main" Requires="p159">
+  <mc:AlternateContent xmlns:mc="http://schemas.openxmlformats.org/markup-compatibility/2006" xmlns:p159="http://schemas.microsoft.com/office/powerpoint/2015/09/main">
+    <mc:Choice Requires="p159">
       <p:transition xmlns:p14="http://schemas.microsoft.com/office/powerpoint/2010/main" spd="slow" p14:dur="2000">
         <p159:morph option="byObject"/>
       </p:transition>
     </mc:Choice>
-    <mc:Fallback>
+    <mc:Fallback xmlns="">
       <p:transition spd="slow">
         <p:fade/>
       </p:transition>
@@ -15956,24 +16064,6 @@
 </file>
 
 <file path=customXml/item1.xml><?xml version="1.0" encoding="utf-8"?>
-<p:properties xmlns:p="http://schemas.microsoft.com/office/2006/metadata/properties" xmlns:xsi="http://www.w3.org/2001/XMLSchema-instance" xmlns:pc="http://schemas.microsoft.com/office/infopath/2007/PartnerControls">
-  <documentManagement>
-    <Status xmlns="71af3243-3dd4-4a8d-8c0d-dd76da1f02a5">Not started</Status>
-    <MediaServiceKeyPoints xmlns="71af3243-3dd4-4a8d-8c0d-dd76da1f02a5" xsi:nil="true"/>
-  </documentManagement>
-</p:properties>
-</file>
-
-<file path=customXml/item2.xml><?xml version="1.0" encoding="utf-8"?>
-<?mso-contentType ?>
-<FormTemplates xmlns="http://schemas.microsoft.com/sharepoint/v3/contenttype/forms">
-  <Display>DocumentLibraryForm</Display>
-  <Edit>DocumentLibraryForm</Edit>
-  <New>DocumentLibraryForm</New>
-</FormTemplates>
-</file>
-
-<file path=customXml/item3.xml><?xml version="1.0" encoding="utf-8"?>
 <ct:contentTypeSchema xmlns:ct="http://schemas.microsoft.com/office/2006/metadata/contentType" xmlns:ma="http://schemas.microsoft.com/office/2006/metadata/properties/metaAttributes" ct:_="" ma:_="" ma:contentTypeName="Document" ma:contentTypeID="0x01010079F111ED35F8CC479449609E8A0923A6" ma:contentTypeVersion="12" ma:contentTypeDescription="Create a new document." ma:contentTypeScope="" ma:versionID="a410dd7f93c95333ffa1b60ed6adedd1">
   <xsd:schema xmlns:xsd="http://www.w3.org/2001/XMLSchema" xmlns:xs="http://www.w3.org/2001/XMLSchema" xmlns:p="http://schemas.microsoft.com/office/2006/metadata/properties" xmlns:ns2="71af3243-3dd4-4a8d-8c0d-dd76da1f02a5" xmlns:ns3="16c05727-aa75-4e4a-9b5f-8a80a1165891" targetNamespace="http://schemas.microsoft.com/office/2006/metadata/properties" ma:root="true" ma:fieldsID="a936d9baba76aa3866493feff160faab" ns2:_="" ns3:_="">
     <xsd:import namespace="71af3243-3dd4-4a8d-8c0d-dd76da1f02a5"/>
@@ -16194,25 +16284,25 @@
 </ct:contentTypeSchema>
 </file>
 
-<file path=customXml/itemProps1.xml><?xml version="1.0" encoding="utf-8"?>
-<ds:datastoreItem xmlns:ds="http://schemas.openxmlformats.org/officeDocument/2006/customXml" ds:itemID="{946BCBFB-BBC7-42F1-95CD-058E172363A0}">
-  <ds:schemaRefs>
-    <ds:schemaRef ds:uri="http://schemas.microsoft.com/office/2006/metadata/properties"/>
-    <ds:schemaRef ds:uri="http://schemas.microsoft.com/office/infopath/2007/PartnerControls"/>
-    <ds:schemaRef ds:uri="71af3243-3dd4-4a8d-8c0d-dd76da1f02a5"/>
-  </ds:schemaRefs>
-</ds:datastoreItem>
+<file path=customXml/item2.xml><?xml version="1.0" encoding="utf-8"?>
+<?mso-contentType ?>
+<FormTemplates xmlns="http://schemas.microsoft.com/sharepoint/v3/contenttype/forms">
+  <Display>DocumentLibraryForm</Display>
+  <Edit>DocumentLibraryForm</Edit>
+  <New>DocumentLibraryForm</New>
+</FormTemplates>
 </file>
 
-<file path=customXml/itemProps2.xml><?xml version="1.0" encoding="utf-8"?>
-<ds:datastoreItem xmlns:ds="http://schemas.openxmlformats.org/officeDocument/2006/customXml" ds:itemID="{1259D436-C82E-43E0-8A01-53DF9CED6032}">
-  <ds:schemaRefs>
-    <ds:schemaRef ds:uri="http://schemas.microsoft.com/sharepoint/v3/contenttype/forms"/>
-  </ds:schemaRefs>
-</ds:datastoreItem>
+<file path=customXml/item3.xml><?xml version="1.0" encoding="utf-8"?>
+<p:properties xmlns:p="http://schemas.microsoft.com/office/2006/metadata/properties" xmlns:xsi="http://www.w3.org/2001/XMLSchema-instance" xmlns:pc="http://schemas.microsoft.com/office/infopath/2007/PartnerControls">
+  <documentManagement>
+    <Status xmlns="71af3243-3dd4-4a8d-8c0d-dd76da1f02a5">Not started</Status>
+    <MediaServiceKeyPoints xmlns="71af3243-3dd4-4a8d-8c0d-dd76da1f02a5" xsi:nil="true"/>
+  </documentManagement>
+</p:properties>
 </file>
 
-<file path=customXml/itemProps3.xml><?xml version="1.0" encoding="utf-8"?>
+<file path=customXml/itemProps1.xml><?xml version="1.0" encoding="utf-8"?>
 <ds:datastoreItem xmlns:ds="http://schemas.openxmlformats.org/officeDocument/2006/customXml" ds:itemID="{1F91CDEB-92ED-41DC-BF33-2916A7687628}">
   <ds:schemaRefs>
     <ds:schemaRef ds:uri="http://schemas.microsoft.com/office/2006/metadata/contentType"/>
@@ -16229,4 +16319,22 @@
     <ds:schemaRef ds:uri="http://schemas.microsoft.com/internal/obd"/>
   </ds:schemaRefs>
 </ds:datastoreItem>
+</file>
+
+<file path=customXml/itemProps2.xml><?xml version="1.0" encoding="utf-8"?>
+<ds:datastoreItem xmlns:ds="http://schemas.openxmlformats.org/officeDocument/2006/customXml" ds:itemID="{1259D436-C82E-43E0-8A01-53DF9CED6032}">
+  <ds:schemaRefs>
+    <ds:schemaRef ds:uri="http://schemas.microsoft.com/sharepoint/v3/contenttype/forms"/>
+  </ds:schemaRefs>
+</ds:datastoreItem>
+</file>
+
+<file path=customXml/itemProps3.xml><?xml version="1.0" encoding="utf-8"?>
+<ds:datastoreItem xmlns:ds="http://schemas.openxmlformats.org/officeDocument/2006/customXml" ds:itemID="{946BCBFB-BBC7-42F1-95CD-058E172363A0}">
+  <ds:schemaRefs>
+    <ds:schemaRef ds:uri="http://schemas.microsoft.com/office/2006/metadata/properties"/>
+    <ds:schemaRef ds:uri="http://schemas.microsoft.com/office/infopath/2007/PartnerControls"/>
+    <ds:schemaRef ds:uri="71af3243-3dd4-4a8d-8c0d-dd76da1f02a5"/>
+  </ds:schemaRefs>
+</ds:datastoreItem>
 </file>
</xml_diff>